<commit_message>
Update BeAScout Roundtable presentation with post-presentation feedback
- Incorporates feedback from October 13, 2025 roundtable presentation
- Replaces original with improved version based on audience input
</commit_message>
<xml_diff>
--- a/docs/BeAScout_Roundtable_Presentation_13Oct2025.pptx
+++ b/docs/BeAScout_Roundtable_Presentation_13Oct2025.pptx
@@ -220,7 +220,7 @@
           <a:p>
             <a:fld id="{696C9B82-80EA-C942-B938-C37177E1830A}" type="datetimeFigureOut">
               <a:rPr lang="en-US" smtClean="0"/>
-              <a:t>10/13/25</a:t>
+              <a:t>10/14/25</a:t>
             </a:fld>
             <a:endParaRPr lang="en-US"/>
           </a:p>
@@ -634,7 +634,7 @@
           <a:p>
             <a:fld id="{E31AF35F-187E-4240-B4FD-B5920E64E2AC}" type="datetime1">
               <a:rPr lang="en-US" smtClean="0"/>
-              <a:t>10/13/25</a:t>
+              <a:t>10/14/25</a:t>
             </a:fld>
             <a:endParaRPr lang="en-US"/>
           </a:p>
@@ -832,7 +832,7 @@
           <a:p>
             <a:fld id="{FDE100C2-A5FD-B646-B78E-ED3689862E61}" type="datetime1">
               <a:rPr lang="en-US" smtClean="0"/>
-              <a:t>10/13/25</a:t>
+              <a:t>10/14/25</a:t>
             </a:fld>
             <a:endParaRPr lang="en-US"/>
           </a:p>
@@ -1040,7 +1040,7 @@
           <a:p>
             <a:fld id="{4256EA6B-37B2-484C-A630-C006F6E033BA}" type="datetime1">
               <a:rPr lang="en-US" smtClean="0"/>
-              <a:t>10/13/25</a:t>
+              <a:t>10/14/25</a:t>
             </a:fld>
             <a:endParaRPr lang="en-US"/>
           </a:p>
@@ -1238,7 +1238,7 @@
           <a:p>
             <a:fld id="{611B1878-7D76-F846-9E58-DF2FD4326B6D}" type="datetime1">
               <a:rPr lang="en-US" smtClean="0"/>
-              <a:t>10/13/25</a:t>
+              <a:t>10/14/25</a:t>
             </a:fld>
             <a:endParaRPr lang="en-US"/>
           </a:p>
@@ -1513,7 +1513,7 @@
           <a:p>
             <a:fld id="{FC0EA922-C384-D340-8C67-2A6182CE876B}" type="datetime1">
               <a:rPr lang="en-US" smtClean="0"/>
-              <a:t>10/13/25</a:t>
+              <a:t>10/14/25</a:t>
             </a:fld>
             <a:endParaRPr lang="en-US"/>
           </a:p>
@@ -1778,7 +1778,7 @@
           <a:p>
             <a:fld id="{FB52F9BC-CC9A-A844-BEA2-DECD923932A9}" type="datetime1">
               <a:rPr lang="en-US" smtClean="0"/>
-              <a:t>10/13/25</a:t>
+              <a:t>10/14/25</a:t>
             </a:fld>
             <a:endParaRPr lang="en-US"/>
           </a:p>
@@ -2190,7 +2190,7 @@
           <a:p>
             <a:fld id="{B792A4B7-DF90-FD47-BAA0-1A9723BE74C7}" type="datetime1">
               <a:rPr lang="en-US" smtClean="0"/>
-              <a:t>10/13/25</a:t>
+              <a:t>10/14/25</a:t>
             </a:fld>
             <a:endParaRPr lang="en-US"/>
           </a:p>
@@ -2331,7 +2331,7 @@
           <a:p>
             <a:fld id="{F97F2C8D-1BD8-F14D-877E-30E13FDCF019}" type="datetime1">
               <a:rPr lang="en-US" smtClean="0"/>
-              <a:t>10/13/25</a:t>
+              <a:t>10/14/25</a:t>
             </a:fld>
             <a:endParaRPr lang="en-US"/>
           </a:p>
@@ -2444,7 +2444,7 @@
           <a:p>
             <a:fld id="{DEDD4161-12B1-C044-95FA-90EB08D5BDBE}" type="datetime1">
               <a:rPr lang="en-US" smtClean="0"/>
-              <a:t>10/13/25</a:t>
+              <a:t>10/14/25</a:t>
             </a:fld>
             <a:endParaRPr lang="en-US"/>
           </a:p>
@@ -2755,7 +2755,7 @@
           <a:p>
             <a:fld id="{A41930FD-7369-2A4E-8338-E737F73A86C7}" type="datetime1">
               <a:rPr lang="en-US" smtClean="0"/>
-              <a:t>10/13/25</a:t>
+              <a:t>10/14/25</a:t>
             </a:fld>
             <a:endParaRPr lang="en-US"/>
           </a:p>
@@ -3043,7 +3043,7 @@
           <a:p>
             <a:fld id="{51E5D301-F1CE-534A-9543-8549665BD794}" type="datetime1">
               <a:rPr lang="en-US" smtClean="0"/>
-              <a:t>10/13/25</a:t>
+              <a:t>10/14/25</a:t>
             </a:fld>
             <a:endParaRPr lang="en-US"/>
           </a:p>
@@ -3284,7 +3284,7 @@
           <a:p>
             <a:fld id="{301CE812-B951-1345-BC3B-F4D80F78CCAD}" type="datetime1">
               <a:rPr lang="en-US" smtClean="0"/>
-              <a:t>10/13/25</a:t>
+              <a:t>10/14/25</a:t>
             </a:fld>
             <a:endParaRPr lang="en-US"/>
           </a:p>
@@ -3739,7 +3739,7 @@
             </a:br>
             <a:r>
               <a:rPr lang="en-US" dirty="0"/>
-              <a:t>Unit Quality</a:t>
+              <a:t>Unit Information Quality</a:t>
             </a:r>
           </a:p>
         </p:txBody>
@@ -3786,7 +3786,7 @@
           <a:p>
             <a:r>
               <a:rPr lang="en-US" dirty="0"/>
-              <a:t>Ira Wolf</a:t>
+              <a:t>Ira Wolf (irawolf81@gmail.com)</a:t>
             </a:r>
           </a:p>
         </p:txBody>
@@ -3973,7 +3973,7 @@
         <p:spPr>
           <a:xfrm>
             <a:off x="838200" y="6131525"/>
-            <a:ext cx="2476960" cy="369332"/>
+            <a:ext cx="3680623" cy="369332"/>
           </a:xfrm>
           <a:prstGeom prst="rect">
             <a:avLst/>
@@ -4000,7 +4000,7 @@
                   <a:srgbClr val="CE1126"/>
                 </a:solidFill>
               </a:rPr>
-              <a:t>Unit Quality</a:t>
+              <a:t>Unit Information Quality</a:t>
             </a:r>
           </a:p>
         </p:txBody>
@@ -4067,9 +4067,29 @@
             </a:r>
           </a:p>
           <a:p>
+            <a:pPr marL="577850" lvl="1" indent="-339725">
+              <a:buFont typeface="Wingdings" pitchFamily="2" charset="2"/>
+              <a:buChar char="Ø"/>
+            </a:pPr>
+            <a:r>
+              <a:rPr lang="en-US" i="1" dirty="0"/>
+              <a:t>Useful meeting schedule but not welcoming,</a:t>
+            </a:r>
+          </a:p>
+          <a:p>
             <a:r>
               <a:rPr lang="en-US" dirty="0"/>
               <a:t>We are a welcoming and fun group of youth-led adventurers who enjoy the outdoors. Our Scouts learn valuable leadership skills and build resilience and self-confidence in a safe, supportive learning environment. We host weekly events and monthly trips throughout the year including canoeing, kayaking, whitewater rafting, hiking, camping, and urban exploration. Join us!</a:t>
+            </a:r>
+          </a:p>
+          <a:p>
+            <a:pPr marL="577850" lvl="1" indent="-339725">
+              <a:buFont typeface="Wingdings" pitchFamily="2" charset="2"/>
+              <a:buChar char="Ø"/>
+            </a:pPr>
+            <a:r>
+              <a:rPr lang="en-US" i="1" dirty="0"/>
+              <a:t>Welcoming but no useful meeting schedule.</a:t>
             </a:r>
           </a:p>
         </p:txBody>
@@ -4138,23 +4158,7 @@
                   <a:srgbClr val="003F87"/>
                 </a:solidFill>
               </a:rPr>
-              <a:t>A </a:t>
-            </a:r>
-            <a:r>
-              <a:rPr lang="en-US" b="1" dirty="0">
-                <a:solidFill>
-                  <a:srgbClr val="CE1126"/>
-                </a:solidFill>
-              </a:rPr>
-              <a:t>Better</a:t>
-            </a:r>
-            <a:r>
-              <a:rPr lang="en-US" b="1" dirty="0">
-                <a:solidFill>
-                  <a:srgbClr val="003F87"/>
-                </a:solidFill>
-              </a:rPr>
-              <a:t> Example Description</a:t>
+              <a:t>A Better Example Description</a:t>
             </a:r>
           </a:p>
         </p:txBody>
@@ -4208,7 +4212,7 @@
         <p:spPr>
           <a:xfrm>
             <a:off x="838200" y="6131525"/>
-            <a:ext cx="2476960" cy="369332"/>
+            <a:ext cx="3680623" cy="369332"/>
           </a:xfrm>
           <a:prstGeom prst="rect">
             <a:avLst/>
@@ -4235,7 +4239,7 @@
                   <a:srgbClr val="CE1126"/>
                 </a:solidFill>
               </a:rPr>
-              <a:t>Unit Quality</a:t>
+              <a:t>Unit Information Quality</a:t>
             </a:r>
           </a:p>
         </p:txBody>
@@ -4300,33 +4304,48 @@
               <a:buNone/>
             </a:pPr>
             <a:r>
-              <a:rPr lang="en-US" dirty="0"/>
+              <a:rPr lang="en-US" sz="2400" dirty="0"/>
               <a:t>We are a welcoming and fun group of youth-led adventurers who enjoy the outdoors. Our Scouts learn valuable leadership skills and build resilience and self-confidence in a safe, supportive learning environment. We </a:t>
             </a:r>
             <a:r>
-              <a:rPr lang="en-US" dirty="0">
-                <a:solidFill>
-                  <a:srgbClr val="CE1126"/>
-                </a:solidFill>
-              </a:rPr>
+              <a:rPr lang="en-US" sz="2400" i="1" dirty="0"/>
               <a:t>meet Wednesdays 6pm-7pm during the school year and</a:t>
             </a:r>
             <a:r>
-              <a:rPr lang="en-US" dirty="0"/>
+              <a:rPr lang="en-US" sz="2400" dirty="0"/>
               <a:t> host monthly trips throughout the year including canoeing, kayaking, whitewater rafting, hiking, camping, and urban exploration. Join us </a:t>
             </a:r>
             <a:r>
-              <a:rPr lang="en-US" dirty="0">
-                <a:solidFill>
-                  <a:srgbClr val="CE1126"/>
-                </a:solidFill>
-              </a:rPr>
+              <a:rPr lang="en-US" sz="2400" i="1" dirty="0"/>
               <a:t>any time</a:t>
             </a:r>
             <a:r>
-              <a:rPr lang="en-US" dirty="0"/>
+              <a:rPr lang="en-US" sz="2400" dirty="0"/>
               <a:t>!</a:t>
             </a:r>
+          </a:p>
+          <a:p>
+            <a:pPr marL="288925" indent="-288925">
+              <a:buFont typeface="Wingdings" pitchFamily="2" charset="2"/>
+              <a:buChar char="Ø"/>
+            </a:pPr>
+            <a:r>
+              <a:rPr lang="en-US" sz="2400" i="1" dirty="0"/>
+              <a:t>Useful meeting schedule and welcoming.</a:t>
+            </a:r>
+          </a:p>
+          <a:p>
+            <a:pPr marL="288925" indent="-288925">
+              <a:buFont typeface="Wingdings" pitchFamily="2" charset="2"/>
+              <a:buChar char="Ø"/>
+            </a:pPr>
+            <a:endParaRPr lang="en-US" sz="2400" i="1" dirty="0"/>
+          </a:p>
+          <a:p>
+            <a:pPr marL="0" indent="0">
+              <a:buNone/>
+            </a:pPr>
+            <a:endParaRPr lang="en-US" dirty="0"/>
           </a:p>
         </p:txBody>
       </p:sp>
@@ -4448,7 +4467,7 @@
         <p:spPr>
           <a:xfrm>
             <a:off x="838200" y="6131525"/>
-            <a:ext cx="2476960" cy="369332"/>
+            <a:ext cx="3680623" cy="369332"/>
           </a:xfrm>
           <a:prstGeom prst="rect">
             <a:avLst/>
@@ -4475,7 +4494,7 @@
                   <a:srgbClr val="CE1126"/>
                 </a:solidFill>
               </a:rPr>
-              <a:t>Unit Quality</a:t>
+              <a:t>Unit Information Quality</a:t>
             </a:r>
           </a:p>
         </p:txBody>
@@ -4548,11 +4567,7 @@
               <a:t>Spend 15 minutes updating your unit’s information in </a:t>
             </a:r>
             <a:r>
-              <a:rPr lang="en-US" sz="2400" dirty="0">
-                <a:solidFill>
-                  <a:srgbClr val="CE1126"/>
-                </a:solidFill>
-              </a:rPr>
+              <a:rPr lang="en-US" sz="2400" b="1" dirty="0"/>
               <a:t>BeAScout.org</a:t>
             </a:r>
             <a:r>
@@ -4572,11 +4587,7 @@
               <a:t>Refer to your individual unit handout for guidance to improve your unit’s information in </a:t>
             </a:r>
             <a:r>
-              <a:rPr lang="en-US" sz="2400" dirty="0">
-                <a:solidFill>
-                  <a:srgbClr val="CE1126"/>
-                </a:solidFill>
-              </a:rPr>
+              <a:rPr lang="en-US" sz="2400" b="1" dirty="0"/>
               <a:t>BeAScout.org</a:t>
             </a:r>
             <a:r>
@@ -4590,16 +4601,12 @@
               <a:t>See </a:t>
             </a:r>
             <a:r>
-              <a:rPr lang="en-US" sz="2400" dirty="0">
-                <a:solidFill>
-                  <a:srgbClr val="CE1126"/>
-                </a:solidFill>
-              </a:rPr>
-              <a:t>BeAScout.org </a:t>
+              <a:rPr lang="en-US" sz="2400" b="1" dirty="0"/>
+              <a:t>BeAScout.org</a:t>
             </a:r>
             <a:r>
               <a:rPr lang="en-US" sz="2400" dirty="0"/>
-              <a:t>update instructions at:</a:t>
+              <a:t> update instructions at:</a:t>
             </a:r>
           </a:p>
           <a:p>
@@ -4607,19 +4614,51 @@
               <a:buNone/>
             </a:pPr>
             <a:r>
-              <a:rPr lang="en-US" sz="2400" i="1" dirty="0"/>
+              <a:rPr lang="en-US" sz="2400" i="1" dirty="0">
+                <a:hlinkClick r:id="rId3">
+                  <a:extLst>
+                    <a:ext uri="{A12FA001-AC4F-418D-AE19-62706E023703}">
+                      <ahyp:hlinkClr xmlns:ahyp="http://schemas.microsoft.com/office/drawing/2018/hyperlinkcolor" val="tx"/>
+                    </a:ext>
+                  </a:extLst>
+                </a:hlinkClick>
+              </a:rPr>
               <a:t>https://</a:t>
             </a:r>
             <a:r>
-              <a:rPr lang="en-US" sz="2400" i="1" dirty="0" err="1"/>
+              <a:rPr lang="en-US" sz="2400" i="1" dirty="0" err="1">
+                <a:hlinkClick r:id="rId3">
+                  <a:extLst>
+                    <a:ext uri="{A12FA001-AC4F-418D-AE19-62706E023703}">
+                      <ahyp:hlinkClr xmlns:ahyp="http://schemas.microsoft.com/office/drawing/2018/hyperlinkcolor" val="tx"/>
+                    </a:ext>
+                  </a:extLst>
+                </a:hlinkClick>
+              </a:rPr>
               <a:t>www.scouting.org</a:t>
             </a:r>
             <a:r>
-              <a:rPr lang="en-US" sz="2400" i="1" dirty="0"/>
+              <a:rPr lang="en-US" sz="2400" i="1" dirty="0">
+                <a:hlinkClick r:id="rId3">
+                  <a:extLst>
+                    <a:ext uri="{A12FA001-AC4F-418D-AE19-62706E023703}">
+                      <ahyp:hlinkClr xmlns:ahyp="http://schemas.microsoft.com/office/drawing/2018/hyperlinkcolor" val="tx"/>
+                    </a:ext>
+                  </a:extLst>
+                </a:hlinkClick>
+              </a:rPr>
               <a:t>/wp-content/uploads/2020/05/Be-A-Scout-Pin-Set-</a:t>
             </a:r>
             <a:r>
-              <a:rPr lang="en-US" sz="2400" i="1" dirty="0" err="1"/>
+              <a:rPr lang="en-US" sz="2400" i="1" dirty="0" err="1">
+                <a:hlinkClick r:id="rId3">
+                  <a:extLst>
+                    <a:ext uri="{A12FA001-AC4F-418D-AE19-62706E023703}">
+                      <ahyp:hlinkClr xmlns:ahyp="http://schemas.microsoft.com/office/drawing/2018/hyperlinkcolor" val="tx"/>
+                    </a:ext>
+                  </a:extLst>
+                </a:hlinkClick>
+              </a:rPr>
               <a:t>up.pdf</a:t>
             </a:r>
             <a:endParaRPr lang="en-US" sz="2400" dirty="0"/>
@@ -4629,21 +4668,6 @@
               <a:rPr lang="en-US" sz="2400" dirty="0"/>
               <a:t>Contact District Executives for technical assistance, if needed.</a:t>
             </a:r>
-          </a:p>
-          <a:p>
-            <a:endParaRPr lang="en-US" sz="2600" dirty="0"/>
-          </a:p>
-          <a:p>
-            <a:endParaRPr lang="en-US" sz="2600" dirty="0"/>
-          </a:p>
-          <a:p>
-            <a:endParaRPr lang="en-US" sz="2600" dirty="0"/>
-          </a:p>
-          <a:p>
-            <a:pPr marL="0" indent="0">
-              <a:buNone/>
-            </a:pPr>
-            <a:endParaRPr lang="en-US" dirty="0"/>
           </a:p>
         </p:txBody>
       </p:sp>
@@ -4891,11 +4915,7 @@
               <a:defRPr sz="2400"/>
             </a:pPr>
             <a:r>
-              <a:rPr lang="en-US" b="1" dirty="0">
-                <a:solidFill>
-                  <a:srgbClr val="CE1126"/>
-                </a:solidFill>
-              </a:rPr>
+              <a:rPr lang="en-US" b="1" dirty="0"/>
               <a:t>BeAScout.org</a:t>
             </a:r>
             <a:r>
@@ -4918,11 +4938,7 @@
               <a:t>When we advertise Scouting, we send families to </a:t>
             </a:r>
             <a:r>
-              <a:rPr lang="en-US" b="1" dirty="0">
-                <a:solidFill>
-                  <a:srgbClr val="CE1126"/>
-                </a:solidFill>
-              </a:rPr>
+              <a:rPr lang="en-US" b="1" dirty="0"/>
               <a:t>BeAScout.org</a:t>
             </a:r>
             <a:r>
@@ -4945,11 +4961,7 @@
               <a:t>Your unit listing in </a:t>
             </a:r>
             <a:r>
-              <a:rPr lang="en-US" b="1" dirty="0">
-                <a:solidFill>
-                  <a:srgbClr val="CE1126"/>
-                </a:solidFill>
-              </a:rPr>
+              <a:rPr lang="en-US" b="1" dirty="0"/>
               <a:t>BeAScout.org</a:t>
             </a:r>
             <a:r>
@@ -5011,7 +5023,7 @@
         <p:spPr>
           <a:xfrm>
             <a:off x="838200" y="6131525"/>
-            <a:ext cx="2523448" cy="369332"/>
+            <a:ext cx="3680623" cy="369332"/>
           </a:xfrm>
           <a:prstGeom prst="rect">
             <a:avLst/>
@@ -5038,7 +5050,7 @@
                   <a:srgbClr val="CE1126"/>
                 </a:solidFill>
               </a:rPr>
-              <a:t>Unit Quality</a:t>
+              <a:t>Unit Information Quality</a:t>
             </a:r>
           </a:p>
         </p:txBody>
@@ -5185,11 +5197,7 @@
               <a:defRPr sz="2400"/>
             </a:pPr>
             <a:r>
-              <a:rPr lang="en-US" b="1" dirty="0">
-                <a:solidFill>
-                  <a:srgbClr val="CE1126"/>
-                </a:solidFill>
-              </a:rPr>
+              <a:rPr lang="en-US" b="1" dirty="0"/>
               <a:t>Meeting Day</a:t>
             </a:r>
           </a:p>
@@ -5204,23 +5212,20 @@
               <a:defRPr sz="2400"/>
             </a:pPr>
             <a:r>
-              <a:rPr lang="en-US" b="1" dirty="0">
-                <a:solidFill>
-                  <a:srgbClr val="CE1126"/>
-                </a:solidFill>
-              </a:rPr>
+              <a:rPr lang="en-US" b="1" dirty="0"/>
               <a:t>Meeting Time</a:t>
             </a:r>
           </a:p>
           <a:p>
-            <a:pPr marL="231775" indent="0">
+            <a:pPr marL="574675" indent="-342900">
               <a:spcBef>
                 <a:spcPts val="1200"/>
               </a:spcBef>
               <a:spcAft>
                 <a:spcPts val="1200"/>
               </a:spcAft>
-              <a:buNone/>
+              <a:buFont typeface="Wingdings" pitchFamily="2" charset="2"/>
+              <a:buChar char="Ø"/>
               <a:defRPr sz="2400"/>
             </a:pPr>
             <a:r>
@@ -5239,34 +5244,26 @@
               <a:defRPr sz="2400"/>
             </a:pPr>
             <a:r>
-              <a:rPr lang="en-US" b="1" dirty="0">
-                <a:solidFill>
-                  <a:srgbClr val="CE1126"/>
-                </a:solidFill>
-              </a:rPr>
+              <a:rPr lang="en-US" b="1" dirty="0"/>
               <a:t>Meeting Location</a:t>
             </a:r>
           </a:p>
           <a:p>
-            <a:pPr marL="231775" indent="0">
+            <a:pPr marL="574675" indent="-342900">
               <a:spcBef>
                 <a:spcPts val="1200"/>
               </a:spcBef>
               <a:spcAft>
                 <a:spcPts val="1200"/>
               </a:spcAft>
-              <a:buNone/>
+              <a:buFont typeface="Wingdings" pitchFamily="2" charset="2"/>
+              <a:buChar char="Ø"/>
               <a:defRPr sz="2400"/>
             </a:pPr>
             <a:r>
               <a:rPr lang="en-US" i="1" dirty="0"/>
               <a:t>“Is the unit’s meeting location convenient to my family?”</a:t>
             </a:r>
-            <a:endParaRPr lang="en-US" i="1" dirty="0">
-              <a:solidFill>
-                <a:srgbClr val="CE1126"/>
-              </a:solidFill>
-            </a:endParaRPr>
           </a:p>
           <a:p>
             <a:pPr>
@@ -5279,34 +5276,26 @@
               <a:defRPr sz="2400"/>
             </a:pPr>
             <a:r>
-              <a:rPr lang="en-US" b="1" dirty="0">
-                <a:solidFill>
-                  <a:srgbClr val="CE1126"/>
-                </a:solidFill>
-              </a:rPr>
+              <a:rPr lang="en-US" b="1" dirty="0"/>
               <a:t>Contact Email</a:t>
             </a:r>
           </a:p>
           <a:p>
-            <a:pPr marL="231775" indent="0">
+            <a:pPr marL="574675" indent="-342900">
               <a:spcBef>
                 <a:spcPts val="1200"/>
               </a:spcBef>
               <a:spcAft>
                 <a:spcPts val="1200"/>
               </a:spcAft>
-              <a:buNone/>
+              <a:buFont typeface="Wingdings" pitchFamily="2" charset="2"/>
+              <a:buChar char="Ø"/>
               <a:defRPr sz="2400"/>
             </a:pPr>
             <a:r>
               <a:rPr lang="en-US" i="1" dirty="0"/>
               <a:t>“Whom do I contact for more information?”</a:t>
             </a:r>
-            <a:endParaRPr lang="en-US" i="1" dirty="0">
-              <a:solidFill>
-                <a:srgbClr val="CE1126"/>
-              </a:solidFill>
-            </a:endParaRPr>
           </a:p>
           <a:p>
             <a:pPr>
@@ -5375,7 +5364,7 @@
         <p:spPr>
           <a:xfrm>
             <a:off x="838200" y="6131525"/>
-            <a:ext cx="2476960" cy="369332"/>
+            <a:ext cx="3680623" cy="369332"/>
           </a:xfrm>
           <a:prstGeom prst="rect">
             <a:avLst/>
@@ -5402,7 +5391,7 @@
                   <a:srgbClr val="CE1126"/>
                 </a:solidFill>
               </a:rPr>
-              <a:t>Unit Quality</a:t>
+              <a:t>Unit Information Quality</a:t>
             </a:r>
           </a:p>
         </p:txBody>
@@ -5549,23 +5538,20 @@
               <a:defRPr sz="2400"/>
             </a:pPr>
             <a:r>
-              <a:rPr lang="en-US" b="1" dirty="0">
-                <a:solidFill>
-                  <a:srgbClr val="CE1126"/>
-                </a:solidFill>
-              </a:rPr>
+              <a:rPr lang="en-US" b="1" dirty="0"/>
               <a:t>Description</a:t>
             </a:r>
           </a:p>
           <a:p>
-            <a:pPr marL="231775" indent="0">
+            <a:pPr marL="574675" indent="-342900">
               <a:spcBef>
                 <a:spcPts val="1200"/>
               </a:spcBef>
               <a:spcAft>
                 <a:spcPts val="1200"/>
               </a:spcAft>
-              <a:buNone/>
+              <a:buFont typeface="Wingdings" pitchFamily="2" charset="2"/>
+              <a:buChar char="Ø"/>
               <a:defRPr sz="2400"/>
             </a:pPr>
             <a:r>
@@ -5574,19 +5560,20 @@
             </a:r>
           </a:p>
           <a:p>
-            <a:pPr marL="231775" indent="0">
+            <a:pPr marL="574675" indent="-342900">
               <a:spcBef>
                 <a:spcPts val="1200"/>
               </a:spcBef>
               <a:spcAft>
                 <a:spcPts val="1200"/>
               </a:spcAft>
-              <a:buNone/>
+              <a:buFont typeface="Wingdings" pitchFamily="2" charset="2"/>
+              <a:buChar char="Ø"/>
               <a:defRPr sz="2400"/>
             </a:pPr>
             <a:r>
               <a:rPr lang="en-US" dirty="0"/>
-              <a:t>It answers </a:t>
+              <a:t>It answers: </a:t>
             </a:r>
             <a:r>
               <a:rPr lang="en-US" i="1" dirty="0"/>
@@ -5604,23 +5591,20 @@
               <a:defRPr sz="2400"/>
             </a:pPr>
             <a:r>
-              <a:rPr lang="en-US" b="1" dirty="0">
-                <a:solidFill>
-                  <a:srgbClr val="CE1126"/>
-                </a:solidFill>
-              </a:rPr>
+              <a:rPr lang="en-US" b="1" dirty="0"/>
               <a:t>Social Media / Website</a:t>
             </a:r>
           </a:p>
           <a:p>
-            <a:pPr marL="231775" indent="0">
+            <a:pPr marL="574675" indent="-342900">
               <a:spcBef>
                 <a:spcPts val="1200"/>
               </a:spcBef>
               <a:spcAft>
                 <a:spcPts val="1200"/>
               </a:spcAft>
-              <a:buNone/>
+              <a:buFont typeface="Wingdings" pitchFamily="2" charset="2"/>
+              <a:buChar char="Ø"/>
               <a:defRPr sz="2400"/>
             </a:pPr>
             <a:r>
@@ -5631,11 +5615,6 @@
               <a:rPr lang="en-US" i="1" dirty="0"/>
               <a:t>“I want to be part of that unit!”</a:t>
             </a:r>
-            <a:endParaRPr lang="en-US" i="1" dirty="0">
-              <a:solidFill>
-                <a:srgbClr val="CE1126"/>
-              </a:solidFill>
-            </a:endParaRPr>
           </a:p>
           <a:p>
             <a:pPr>
@@ -5648,34 +5627,26 @@
               <a:defRPr sz="2400"/>
             </a:pPr>
             <a:r>
-              <a:rPr lang="en-US" b="1" dirty="0">
-                <a:solidFill>
-                  <a:srgbClr val="CE1126"/>
-                </a:solidFill>
-              </a:rPr>
+              <a:rPr lang="en-US" b="1" dirty="0"/>
               <a:t>Contact Person and Phone Number</a:t>
             </a:r>
           </a:p>
           <a:p>
-            <a:pPr marL="231775" indent="0">
+            <a:pPr marL="574675" indent="-342900">
               <a:spcBef>
                 <a:spcPts val="1200"/>
               </a:spcBef>
               <a:spcAft>
                 <a:spcPts val="1200"/>
               </a:spcAft>
-              <a:buNone/>
+              <a:buFont typeface="Wingdings" pitchFamily="2" charset="2"/>
+              <a:buChar char="Ø"/>
               <a:defRPr sz="2400"/>
             </a:pPr>
             <a:r>
               <a:rPr lang="en-US" dirty="0"/>
               <a:t>An optional contact point for families.</a:t>
             </a:r>
-            <a:endParaRPr lang="en-US" dirty="0">
-              <a:solidFill>
-                <a:srgbClr val="CE1126"/>
-              </a:solidFill>
-            </a:endParaRPr>
           </a:p>
           <a:p>
             <a:pPr>
@@ -5744,7 +5715,7 @@
         <p:spPr>
           <a:xfrm>
             <a:off x="838200" y="6131525"/>
-            <a:ext cx="2476960" cy="369332"/>
+            <a:ext cx="3680623" cy="369332"/>
           </a:xfrm>
           <a:prstGeom prst="rect">
             <a:avLst/>
@@ -5771,7 +5742,7 @@
                   <a:srgbClr val="CE1126"/>
                 </a:solidFill>
               </a:rPr>
-              <a:t>Unit Quality</a:t>
+              <a:t>Unit Information Quality</a:t>
             </a:r>
           </a:p>
         </p:txBody>
@@ -6042,7 +6013,7 @@
         <p:spPr>
           <a:xfrm>
             <a:off x="838200" y="6131525"/>
-            <a:ext cx="2476960" cy="369332"/>
+            <a:ext cx="3680623" cy="369332"/>
           </a:xfrm>
           <a:prstGeom prst="rect">
             <a:avLst/>
@@ -6069,7 +6040,7 @@
                   <a:srgbClr val="CE1126"/>
                 </a:solidFill>
               </a:rPr>
-              <a:t>Unit Quality</a:t>
+              <a:t>Unit Information Quality</a:t>
             </a:r>
           </a:p>
         </p:txBody>
@@ -6173,7 +6144,7 @@
                   <a:srgbClr val="003F87"/>
                 </a:solidFill>
               </a:rPr>
-              <a:t>Quality Scoring</a:t>
+              <a:t>Unit Information Quality Scoring</a:t>
             </a:r>
           </a:p>
         </p:txBody>
@@ -6224,11 +6195,7 @@
               <a:t>An application was created to analyze the quality for each HNE unit in </a:t>
             </a:r>
             <a:r>
-              <a:rPr lang="en-US" sz="2400" dirty="0">
-                <a:solidFill>
-                  <a:srgbClr val="CE1126"/>
-                </a:solidFill>
-              </a:rPr>
+              <a:rPr lang="en-US" sz="2400" b="1" dirty="0"/>
               <a:t>BeAScout.org</a:t>
             </a:r>
             <a:r>
@@ -6250,16 +6217,8 @@
               <a:defRPr sz="2400"/>
             </a:pPr>
             <a:r>
-              <a:rPr lang="en-US" sz="1800" b="1" dirty="0">
-                <a:solidFill>
-                  <a:srgbClr val="CE1126"/>
-                </a:solidFill>
-              </a:rPr>
-              <a:t>Meeting Day	</a:t>
-            </a:r>
-            <a:r>
               <a:rPr lang="en-US" sz="1800" b="1" dirty="0"/>
-              <a:t>25%</a:t>
+              <a:t>Meeting Day	25%</a:t>
             </a:r>
             <a:r>
               <a:rPr lang="en-US" sz="1800" dirty="0"/>
@@ -6280,16 +6239,8 @@
               <a:defRPr sz="2400"/>
             </a:pPr>
             <a:r>
-              <a:rPr lang="en-US" sz="1800" b="1" dirty="0">
-                <a:solidFill>
-                  <a:srgbClr val="CE1126"/>
-                </a:solidFill>
-              </a:rPr>
-              <a:t>Meeting Time	</a:t>
-            </a:r>
-            <a:r>
               <a:rPr lang="en-US" sz="1800" b="1" dirty="0"/>
-              <a:t>25%</a:t>
+              <a:t>Meeting Time	25%</a:t>
             </a:r>
             <a:r>
               <a:rPr lang="en-US" sz="1800" dirty="0"/>
@@ -6310,16 +6261,8 @@
               <a:defRPr sz="2400"/>
             </a:pPr>
             <a:r>
-              <a:rPr lang="en-US" sz="1800" b="1" dirty="0">
-                <a:solidFill>
-                  <a:srgbClr val="CE1126"/>
-                </a:solidFill>
-              </a:rPr>
-              <a:t>Meeting Location	</a:t>
-            </a:r>
-            <a:r>
               <a:rPr lang="en-US" sz="1800" b="1" dirty="0"/>
-              <a:t>25%</a:t>
+              <a:t>Meeting Location	25%</a:t>
             </a:r>
             <a:r>
               <a:rPr lang="en-US" sz="1800" dirty="0"/>
@@ -6386,16 +6329,8 @@
               <a:defRPr sz="2400"/>
             </a:pPr>
             <a:r>
-              <a:rPr lang="en-US" sz="1800" b="1" dirty="0">
-                <a:solidFill>
-                  <a:srgbClr val="CE1126"/>
-                </a:solidFill>
-              </a:rPr>
-              <a:t>Contact Email	</a:t>
-            </a:r>
-            <a:r>
               <a:rPr lang="en-US" sz="1800" b="1" dirty="0"/>
-              <a:t>25%</a:t>
+              <a:t>Contact Email	25%</a:t>
             </a:r>
             <a:r>
               <a:rPr lang="en-US" sz="1800" dirty="0"/>
@@ -6481,7 +6416,7 @@
         <p:spPr>
           <a:xfrm>
             <a:off x="838200" y="6131525"/>
-            <a:ext cx="2476960" cy="369332"/>
+            <a:ext cx="3680623" cy="369332"/>
           </a:xfrm>
           <a:prstGeom prst="rect">
             <a:avLst/>
@@ -6508,7 +6443,7 @@
                   <a:srgbClr val="CE1126"/>
                 </a:solidFill>
               </a:rPr>
-              <a:t>Unit Quality</a:t>
+              <a:t>Unit Information Quality</a:t>
             </a:r>
           </a:p>
         </p:txBody>
@@ -6612,7 +6547,7 @@
                   <a:srgbClr val="003F87"/>
                 </a:solidFill>
               </a:rPr>
-              <a:t>Council-wide Quality Scores</a:t>
+              <a:t>Council-wide Unit Information Scores</a:t>
             </a:r>
           </a:p>
         </p:txBody>
@@ -6636,7 +6571,7 @@
         <p:spPr>
           <a:xfrm>
             <a:off x="838200" y="1692319"/>
-            <a:ext cx="10515600" cy="4351338"/>
+            <a:ext cx="5257800" cy="4351338"/>
           </a:xfrm>
         </p:spPr>
         <p:txBody>
@@ -6657,15 +6592,7 @@
             </a:pPr>
             <a:r>
               <a:rPr lang="en-US" b="1" dirty="0"/>
-              <a:t>Total Units: </a:t>
-            </a:r>
-            <a:r>
-              <a:rPr lang="en-US" b="1" dirty="0">
-                <a:solidFill>
-                  <a:srgbClr val="003F87"/>
-                </a:solidFill>
-              </a:rPr>
-              <a:t>167 units</a:t>
+              <a:t>Total Units: 167 units</a:t>
             </a:r>
           </a:p>
           <a:p>
@@ -6685,9 +6612,9 @@
             </a:r>
             <a:r>
               <a:rPr lang="en-US" b="1" dirty="0">
-                <a:solidFill>
-                  <a:srgbClr val="CE1126"/>
-                </a:solidFill>
+                <a:highlight>
+                  <a:srgbClr val="FFFF00"/>
+                </a:highlight>
               </a:rPr>
               <a:t>57.1%</a:t>
             </a:r>
@@ -6720,7 +6647,11 @@
               <a:defRPr sz="2400"/>
             </a:pPr>
             <a:r>
-              <a:rPr lang="en-US" b="1" dirty="0"/>
+              <a:rPr lang="en-US" b="1" dirty="0">
+                <a:highlight>
+                  <a:srgbClr val="00FF00"/>
+                </a:highlight>
+              </a:rPr>
               <a:t>Grade A (90%+): 17 units (10% of units)</a:t>
             </a:r>
           </a:p>
@@ -6736,7 +6667,11 @@
               <a:defRPr sz="2400"/>
             </a:pPr>
             <a:r>
-              <a:rPr lang="en-US" b="1" dirty="0"/>
+              <a:rPr lang="en-US" b="1" dirty="0">
+                <a:highlight>
+                  <a:srgbClr val="00FF00"/>
+                </a:highlight>
+              </a:rPr>
               <a:t>Grade B (80-89%): 40 units (24% of units)</a:t>
             </a:r>
           </a:p>
@@ -6785,9 +6720,9 @@
             </a:pPr>
             <a:r>
               <a:rPr lang="en-US" b="1" dirty="0">
-                <a:solidFill>
-                  <a:srgbClr val="CE1126"/>
-                </a:solidFill>
+                <a:highlight>
+                  <a:srgbClr val="FFFF00"/>
+                </a:highlight>
               </a:rPr>
               <a:t>Grade F (&lt;60%): 84 units (50% units)</a:t>
             </a:r>
@@ -6805,16 +6740,16 @@
             </a:pPr>
             <a:r>
               <a:rPr lang="en-US" b="1" dirty="0">
-                <a:solidFill>
-                  <a:srgbClr val="CE1126"/>
-                </a:solidFill>
+                <a:highlight>
+                  <a:srgbClr val="FFFF00"/>
+                </a:highlight>
               </a:rPr>
               <a:t>Grade N/A (Missing): 2 units (1% of units)</a:t>
             </a:r>
             <a:endParaRPr lang="en-US" dirty="0">
-              <a:solidFill>
-                <a:srgbClr val="CE1126"/>
-              </a:solidFill>
+              <a:highlight>
+                <a:srgbClr val="FFFF00"/>
+              </a:highlight>
             </a:endParaRPr>
           </a:p>
         </p:txBody>
@@ -6868,7 +6803,7 @@
         <p:spPr>
           <a:xfrm>
             <a:off x="838200" y="6131525"/>
-            <a:ext cx="2476960" cy="369332"/>
+            <a:ext cx="3680623" cy="369332"/>
           </a:xfrm>
           <a:prstGeom prst="rect">
             <a:avLst/>
@@ -6895,7 +6830,7 @@
                   <a:srgbClr val="CE1126"/>
                 </a:solidFill>
               </a:rPr>
-              <a:t>Unit Quality</a:t>
+              <a:t>Unit Information Quality</a:t>
             </a:r>
           </a:p>
         </p:txBody>
@@ -6932,6 +6867,242 @@
               <a:t>7</a:t>
             </a:fld>
             <a:endParaRPr lang="en-US" dirty="0"/>
+          </a:p>
+        </p:txBody>
+      </p:sp>
+      <p:sp>
+        <p:nvSpPr>
+          <p:cNvPr id="4" name="Content Placeholder 2">
+            <a:extLst>
+              <a:ext uri="{FF2B5EF4-FFF2-40B4-BE49-F238E27FC236}">
+                <a16:creationId xmlns:a16="http://schemas.microsoft.com/office/drawing/2014/main" id="{8BEB154F-81C7-6258-58E9-1B77374EE5DF}"/>
+              </a:ext>
+            </a:extLst>
+          </p:cNvPr>
+          <p:cNvSpPr txBox="1">
+            <a:spLocks/>
+          </p:cNvSpPr>
+          <p:nvPr/>
+        </p:nvSpPr>
+        <p:spPr>
+          <a:xfrm>
+            <a:off x="6096000" y="1690216"/>
+            <a:ext cx="5257800" cy="4351338"/>
+          </a:xfrm>
+          <a:prstGeom prst="rect">
+            <a:avLst/>
+          </a:prstGeom>
+        </p:spPr>
+        <p:txBody>
+          <a:bodyPr vert="horz" lIns="91440" tIns="45720" rIns="91440" bIns="45720" rtlCol="0">
+            <a:normAutofit/>
+          </a:bodyPr>
+          <a:lstStyle>
+            <a:lvl1pPr marL="228600" indent="-228600" algn="l" defTabSz="914400" rtl="0" eaLnBrk="1" latinLnBrk="0" hangingPunct="1">
+              <a:lnSpc>
+                <a:spcPct val="90000"/>
+              </a:lnSpc>
+              <a:spcBef>
+                <a:spcPts val="1000"/>
+              </a:spcBef>
+              <a:buFont typeface="Arial" panose="020B0604020202020204" pitchFamily="34" charset="0"/>
+              <a:buChar char="•"/>
+              <a:defRPr sz="2800" kern="1200">
+                <a:solidFill>
+                  <a:schemeClr val="tx1"/>
+                </a:solidFill>
+                <a:latin typeface="+mn-lt"/>
+                <a:ea typeface="+mn-ea"/>
+                <a:cs typeface="+mn-cs"/>
+              </a:defRPr>
+            </a:lvl1pPr>
+            <a:lvl2pPr marL="685800" indent="-228600" algn="l" defTabSz="914400" rtl="0" eaLnBrk="1" latinLnBrk="0" hangingPunct="1">
+              <a:lnSpc>
+                <a:spcPct val="90000"/>
+              </a:lnSpc>
+              <a:spcBef>
+                <a:spcPts val="500"/>
+              </a:spcBef>
+              <a:buFont typeface="Arial" panose="020B0604020202020204" pitchFamily="34" charset="0"/>
+              <a:buChar char="•"/>
+              <a:defRPr sz="2400" kern="1200">
+                <a:solidFill>
+                  <a:schemeClr val="tx1"/>
+                </a:solidFill>
+                <a:latin typeface="+mn-lt"/>
+                <a:ea typeface="+mn-ea"/>
+                <a:cs typeface="+mn-cs"/>
+              </a:defRPr>
+            </a:lvl2pPr>
+            <a:lvl3pPr marL="1143000" indent="-228600" algn="l" defTabSz="914400" rtl="0" eaLnBrk="1" latinLnBrk="0" hangingPunct="1">
+              <a:lnSpc>
+                <a:spcPct val="90000"/>
+              </a:lnSpc>
+              <a:spcBef>
+                <a:spcPts val="500"/>
+              </a:spcBef>
+              <a:buFont typeface="Arial" panose="020B0604020202020204" pitchFamily="34" charset="0"/>
+              <a:buChar char="•"/>
+              <a:defRPr sz="2000" kern="1200">
+                <a:solidFill>
+                  <a:schemeClr val="tx1"/>
+                </a:solidFill>
+                <a:latin typeface="+mn-lt"/>
+                <a:ea typeface="+mn-ea"/>
+                <a:cs typeface="+mn-cs"/>
+              </a:defRPr>
+            </a:lvl3pPr>
+            <a:lvl4pPr marL="1600200" indent="-228600" algn="l" defTabSz="914400" rtl="0" eaLnBrk="1" latinLnBrk="0" hangingPunct="1">
+              <a:lnSpc>
+                <a:spcPct val="90000"/>
+              </a:lnSpc>
+              <a:spcBef>
+                <a:spcPts val="500"/>
+              </a:spcBef>
+              <a:buFont typeface="Arial" panose="020B0604020202020204" pitchFamily="34" charset="0"/>
+              <a:buChar char="•"/>
+              <a:defRPr sz="1800" kern="1200">
+                <a:solidFill>
+                  <a:schemeClr val="tx1"/>
+                </a:solidFill>
+                <a:latin typeface="+mn-lt"/>
+                <a:ea typeface="+mn-ea"/>
+                <a:cs typeface="+mn-cs"/>
+              </a:defRPr>
+            </a:lvl4pPr>
+            <a:lvl5pPr marL="2057400" indent="-228600" algn="l" defTabSz="914400" rtl="0" eaLnBrk="1" latinLnBrk="0" hangingPunct="1">
+              <a:lnSpc>
+                <a:spcPct val="90000"/>
+              </a:lnSpc>
+              <a:spcBef>
+                <a:spcPts val="500"/>
+              </a:spcBef>
+              <a:buFont typeface="Arial" panose="020B0604020202020204" pitchFamily="34" charset="0"/>
+              <a:buChar char="•"/>
+              <a:defRPr sz="1800" kern="1200">
+                <a:solidFill>
+                  <a:schemeClr val="tx1"/>
+                </a:solidFill>
+                <a:latin typeface="+mn-lt"/>
+                <a:ea typeface="+mn-ea"/>
+                <a:cs typeface="+mn-cs"/>
+              </a:defRPr>
+            </a:lvl5pPr>
+            <a:lvl6pPr marL="2514600" indent="-228600" algn="l" defTabSz="914400" rtl="0" eaLnBrk="1" latinLnBrk="0" hangingPunct="1">
+              <a:lnSpc>
+                <a:spcPct val="90000"/>
+              </a:lnSpc>
+              <a:spcBef>
+                <a:spcPts val="500"/>
+              </a:spcBef>
+              <a:buFont typeface="Arial" panose="020B0604020202020204" pitchFamily="34" charset="0"/>
+              <a:buChar char="•"/>
+              <a:defRPr sz="1800" kern="1200">
+                <a:solidFill>
+                  <a:schemeClr val="tx1"/>
+                </a:solidFill>
+                <a:latin typeface="+mn-lt"/>
+                <a:ea typeface="+mn-ea"/>
+                <a:cs typeface="+mn-cs"/>
+              </a:defRPr>
+            </a:lvl6pPr>
+            <a:lvl7pPr marL="2971800" indent="-228600" algn="l" defTabSz="914400" rtl="0" eaLnBrk="1" latinLnBrk="0" hangingPunct="1">
+              <a:lnSpc>
+                <a:spcPct val="90000"/>
+              </a:lnSpc>
+              <a:spcBef>
+                <a:spcPts val="500"/>
+              </a:spcBef>
+              <a:buFont typeface="Arial" panose="020B0604020202020204" pitchFamily="34" charset="0"/>
+              <a:buChar char="•"/>
+              <a:defRPr sz="1800" kern="1200">
+                <a:solidFill>
+                  <a:schemeClr val="tx1"/>
+                </a:solidFill>
+                <a:latin typeface="+mn-lt"/>
+                <a:ea typeface="+mn-ea"/>
+                <a:cs typeface="+mn-cs"/>
+              </a:defRPr>
+            </a:lvl7pPr>
+            <a:lvl8pPr marL="3429000" indent="-228600" algn="l" defTabSz="914400" rtl="0" eaLnBrk="1" latinLnBrk="0" hangingPunct="1">
+              <a:lnSpc>
+                <a:spcPct val="90000"/>
+              </a:lnSpc>
+              <a:spcBef>
+                <a:spcPts val="500"/>
+              </a:spcBef>
+              <a:buFont typeface="Arial" panose="020B0604020202020204" pitchFamily="34" charset="0"/>
+              <a:buChar char="•"/>
+              <a:defRPr sz="1800" kern="1200">
+                <a:solidFill>
+                  <a:schemeClr val="tx1"/>
+                </a:solidFill>
+                <a:latin typeface="+mn-lt"/>
+                <a:ea typeface="+mn-ea"/>
+                <a:cs typeface="+mn-cs"/>
+              </a:defRPr>
+            </a:lvl8pPr>
+            <a:lvl9pPr marL="3886200" indent="-228600" algn="l" defTabSz="914400" rtl="0" eaLnBrk="1" latinLnBrk="0" hangingPunct="1">
+              <a:lnSpc>
+                <a:spcPct val="90000"/>
+              </a:lnSpc>
+              <a:spcBef>
+                <a:spcPts val="500"/>
+              </a:spcBef>
+              <a:buFont typeface="Arial" panose="020B0604020202020204" pitchFamily="34" charset="0"/>
+              <a:buChar char="•"/>
+              <a:defRPr sz="1800" kern="1200">
+                <a:solidFill>
+                  <a:schemeClr val="tx1"/>
+                </a:solidFill>
+                <a:latin typeface="+mn-lt"/>
+                <a:ea typeface="+mn-ea"/>
+                <a:cs typeface="+mn-cs"/>
+              </a:defRPr>
+            </a:lvl9pPr>
+          </a:lstStyle>
+          <a:p>
+            <a:pPr>
+              <a:spcBef>
+                <a:spcPts val="1200"/>
+              </a:spcBef>
+              <a:spcAft>
+                <a:spcPts val="1200"/>
+              </a:spcAft>
+              <a:defRPr sz="2400"/>
+            </a:pPr>
+            <a:r>
+              <a:rPr lang="en-US" sz="2400" dirty="0"/>
+              <a:t>Only 1/3 of units have minimal required information (Grades A, B).</a:t>
+            </a:r>
+          </a:p>
+          <a:p>
+            <a:pPr>
+              <a:spcBef>
+                <a:spcPts val="1200"/>
+              </a:spcBef>
+              <a:spcAft>
+                <a:spcPts val="1200"/>
+              </a:spcAft>
+              <a:defRPr sz="2400"/>
+            </a:pPr>
+            <a:r>
+              <a:rPr lang="en-US" sz="2400" dirty="0"/>
+              <a:t>1/2 of units have at most 1/2 of minimal required information (Grades F, N/A).</a:t>
+            </a:r>
+          </a:p>
+          <a:p>
+            <a:pPr marL="0" indent="0">
+              <a:spcBef>
+                <a:spcPts val="1200"/>
+              </a:spcBef>
+              <a:spcAft>
+                <a:spcPts val="1200"/>
+              </a:spcAft>
+              <a:buNone/>
+              <a:defRPr sz="2400"/>
+            </a:pPr>
+            <a:endParaRPr lang="en-US" sz="2400" dirty="0"/>
           </a:p>
         </p:txBody>
       </p:sp>
@@ -7053,7 +7224,7 @@
         <p:spPr>
           <a:xfrm>
             <a:off x="838200" y="6131525"/>
-            <a:ext cx="2476960" cy="369332"/>
+            <a:ext cx="3680623" cy="369332"/>
           </a:xfrm>
           <a:prstGeom prst="rect">
             <a:avLst/>
@@ -7080,7 +7251,7 @@
                   <a:srgbClr val="CE1126"/>
                 </a:solidFill>
               </a:rPr>
-              <a:t>Unit Quality</a:t>
+              <a:t>Unit Information Quality</a:t>
             </a:r>
           </a:p>
         </p:txBody>
@@ -7267,7 +7438,7 @@
         <p:spPr>
           <a:xfrm>
             <a:off x="838200" y="6131525"/>
-            <a:ext cx="2476960" cy="369332"/>
+            <a:ext cx="3680623" cy="369332"/>
           </a:xfrm>
           <a:prstGeom prst="rect">
             <a:avLst/>
@@ -7294,7 +7465,7 @@
                   <a:srgbClr val="CE1126"/>
                 </a:solidFill>
               </a:rPr>
-              <a:t>Unit Quality</a:t>
+              <a:t>Unit Information Quality</a:t>
             </a:r>
           </a:p>
         </p:txBody>
@@ -7358,11 +7529,7 @@
           <a:lstStyle/>
           <a:p>
             <a:r>
-              <a:rPr lang="en-US" sz="2400" b="1" dirty="0">
-                <a:solidFill>
-                  <a:srgbClr val="CE1126"/>
-                </a:solidFill>
-              </a:rPr>
+              <a:rPr lang="en-US" sz="2400" b="1" dirty="0"/>
               <a:t>Meeting Location</a:t>
             </a:r>
           </a:p>
@@ -7390,7 +7557,10 @@
             </a:r>
           </a:p>
           <a:p>
-            <a:pPr marL="574675" indent="-342900"/>
+            <a:pPr marL="574675" indent="-342900">
+              <a:buFont typeface="Wingdings" pitchFamily="2" charset="2"/>
+              <a:buChar char="Ø"/>
+            </a:pPr>
             <a:r>
               <a:rPr lang="en-US" sz="2400" dirty="0"/>
               <a:t>Correct address for Google Maps, Waze, etc.</a:t>
@@ -7398,11 +7568,7 @@
           </a:p>
           <a:p>
             <a:r>
-              <a:rPr lang="en-US" sz="2400" b="1" dirty="0">
-                <a:solidFill>
-                  <a:srgbClr val="CE1126"/>
-                </a:solidFill>
-              </a:rPr>
+              <a:rPr lang="en-US" sz="2400" b="1" dirty="0"/>
               <a:t>Contact Email</a:t>
             </a:r>
           </a:p>
@@ -7417,21 +7583,30 @@
             <a:endParaRPr lang="en-US" sz="2400" dirty="0"/>
           </a:p>
           <a:p>
-            <a:pPr marL="582613" lvl="1" indent="-336550"/>
+            <a:pPr marL="588963" lvl="1" indent="-342900">
+              <a:buFont typeface="Wingdings" pitchFamily="2" charset="2"/>
+              <a:buChar char="Ø"/>
+            </a:pPr>
             <a:r>
               <a:rPr lang="en-US" dirty="0"/>
               <a:t>Three leaders should have access to the unit-specific email account.</a:t>
             </a:r>
           </a:p>
           <a:p>
-            <a:pPr marL="582613" lvl="1" indent="-336550"/>
+            <a:pPr marL="588963" lvl="1" indent="-342900">
+              <a:buFont typeface="Wingdings" pitchFamily="2" charset="2"/>
+              <a:buChar char="Ø"/>
+            </a:pPr>
             <a:r>
               <a:rPr lang="en-US" dirty="0"/>
               <a:t>Helps ensure a quick response to inquiries.</a:t>
             </a:r>
           </a:p>
           <a:p>
-            <a:pPr marL="582613" lvl="1" indent="-336550"/>
+            <a:pPr marL="588963" lvl="1" indent="-342900">
+              <a:buFont typeface="Wingdings" pitchFamily="2" charset="2"/>
+              <a:buChar char="Ø"/>
+            </a:pPr>
             <a:r>
               <a:rPr lang="en-US" dirty="0"/>
               <a:t>Maintains continuity as leaders and responsibilities transition over time.</a:t>

</xml_diff>